<commit_message>
final ppt and final raw data files
</commit_message>
<xml_diff>
--- a/Project 3 group presentation2 (1).pptx
+++ b/Project 3 group presentation2 (1).pptx
@@ -5,7 +5,7 @@
     <p:sldMasterId id="2147483820" r:id="rId1"/>
   </p:sldMasterIdLst>
   <p:notesMasterIdLst>
-    <p:notesMasterId r:id="rId17"/>
+    <p:notesMasterId r:id="rId16"/>
   </p:notesMasterIdLst>
   <p:sldIdLst>
     <p:sldId id="256" r:id="rId2"/>
@@ -20,9 +20,8 @@
     <p:sldId id="262" r:id="rId11"/>
     <p:sldId id="267" r:id="rId12"/>
     <p:sldId id="265" r:id="rId13"/>
-    <p:sldId id="269" r:id="rId14"/>
-    <p:sldId id="266" r:id="rId15"/>
-    <p:sldId id="270" r:id="rId16"/>
+    <p:sldId id="266" r:id="rId14"/>
+    <p:sldId id="270" r:id="rId15"/>
   </p:sldIdLst>
   <p:sldSz cx="9144000" cy="6858000" type="screen4x3"/>
   <p:notesSz cx="6858000" cy="9144000"/>
@@ -10383,6 +10382,327 @@
           </a:extLst>
         </p:spPr>
       </p:pic>
+      <p:sp>
+        <p:nvSpPr>
+          <p:cNvPr id="3" name="Text Box 2">
+            <a:extLst>
+              <a:ext uri="{FF2B5EF4-FFF2-40B4-BE49-F238E27FC236}">
+                <a16:creationId xmlns:a16="http://schemas.microsoft.com/office/drawing/2014/main" id="{ABA5E06F-1CE3-E58B-78BB-7ADB52CCD200}"/>
+              </a:ext>
+            </a:extLst>
+          </p:cNvPr>
+          <p:cNvSpPr txBox="1">
+            <a:spLocks noChangeArrowheads="1"/>
+          </p:cNvSpPr>
+          <p:nvPr/>
+        </p:nvSpPr>
+        <p:spPr bwMode="auto">
+          <a:xfrm>
+            <a:off x="684963" y="5313903"/>
+            <a:ext cx="1867318" cy="1468582"/>
+          </a:xfrm>
+          <a:prstGeom prst="rect">
+            <a:avLst/>
+          </a:prstGeom>
+          <a:solidFill>
+            <a:srgbClr val="7030A0"/>
+          </a:solidFill>
+          <a:ln w="38100">
+            <a:solidFill>
+              <a:schemeClr val="bg1"/>
+            </a:solidFill>
+          </a:ln>
+        </p:spPr>
+        <p:txBody>
+          <a:bodyPr vert="horz" lIns="91440" tIns="45720" rIns="91440" bIns="45720" rtlCol="0" anchor="ctr">
+            <a:normAutofit lnSpcReduction="10000"/>
+          </a:bodyPr>
+          <a:lstStyle>
+            <a:lvl1pPr>
+              <a:spcBef>
+                <a:spcPct val="20000"/>
+              </a:spcBef>
+              <a:buChar char="•"/>
+              <a:defRPr sz="3200">
+                <a:solidFill>
+                  <a:schemeClr val="tx1"/>
+                </a:solidFill>
+                <a:latin typeface="Verdana" panose="020B0604030504040204" pitchFamily="34" charset="0"/>
+                <a:cs typeface="Times New Roman" panose="02020603050405020304" pitchFamily="18" charset="0"/>
+              </a:defRPr>
+            </a:lvl1pPr>
+            <a:lvl2pPr marL="742950" indent="-285750">
+              <a:spcBef>
+                <a:spcPct val="20000"/>
+              </a:spcBef>
+              <a:buChar char="–"/>
+              <a:defRPr sz="2800">
+                <a:solidFill>
+                  <a:schemeClr val="tx1"/>
+                </a:solidFill>
+                <a:latin typeface="Verdana" panose="020B0604030504040204" pitchFamily="34" charset="0"/>
+                <a:cs typeface="Times New Roman" panose="02020603050405020304" pitchFamily="18" charset="0"/>
+              </a:defRPr>
+            </a:lvl2pPr>
+            <a:lvl3pPr marL="1143000" indent="-228600">
+              <a:spcBef>
+                <a:spcPct val="20000"/>
+              </a:spcBef>
+              <a:buChar char="•"/>
+              <a:defRPr sz="2400">
+                <a:solidFill>
+                  <a:schemeClr val="tx1"/>
+                </a:solidFill>
+                <a:latin typeface="Verdana" panose="020B0604030504040204" pitchFamily="34" charset="0"/>
+                <a:cs typeface="Times New Roman" panose="02020603050405020304" pitchFamily="18" charset="0"/>
+              </a:defRPr>
+            </a:lvl3pPr>
+            <a:lvl4pPr marL="1600200" indent="-228600">
+              <a:spcBef>
+                <a:spcPct val="20000"/>
+              </a:spcBef>
+              <a:buChar char="–"/>
+              <a:defRPr sz="2000">
+                <a:solidFill>
+                  <a:schemeClr val="tx1"/>
+                </a:solidFill>
+                <a:latin typeface="Verdana" panose="020B0604030504040204" pitchFamily="34" charset="0"/>
+                <a:cs typeface="Times New Roman" panose="02020603050405020304" pitchFamily="18" charset="0"/>
+              </a:defRPr>
+            </a:lvl4pPr>
+            <a:lvl5pPr marL="2057400" indent="-228600">
+              <a:spcBef>
+                <a:spcPct val="20000"/>
+              </a:spcBef>
+              <a:buChar char="»"/>
+              <a:defRPr sz="2000">
+                <a:solidFill>
+                  <a:schemeClr val="tx1"/>
+                </a:solidFill>
+                <a:latin typeface="Verdana" panose="020B0604030504040204" pitchFamily="34" charset="0"/>
+                <a:cs typeface="Times New Roman" panose="02020603050405020304" pitchFamily="18" charset="0"/>
+              </a:defRPr>
+            </a:lvl5pPr>
+            <a:lvl6pPr marL="2514600" indent="-228600" eaLnBrk="0" fontAlgn="base" hangingPunct="0">
+              <a:spcBef>
+                <a:spcPct val="20000"/>
+              </a:spcBef>
+              <a:spcAft>
+                <a:spcPct val="0"/>
+              </a:spcAft>
+              <a:buChar char="»"/>
+              <a:defRPr sz="2000">
+                <a:solidFill>
+                  <a:schemeClr val="tx1"/>
+                </a:solidFill>
+                <a:latin typeface="Verdana" panose="020B0604030504040204" pitchFamily="34" charset="0"/>
+                <a:cs typeface="Times New Roman" panose="02020603050405020304" pitchFamily="18" charset="0"/>
+              </a:defRPr>
+            </a:lvl6pPr>
+            <a:lvl7pPr marL="2971800" indent="-228600" eaLnBrk="0" fontAlgn="base" hangingPunct="0">
+              <a:spcBef>
+                <a:spcPct val="20000"/>
+              </a:spcBef>
+              <a:spcAft>
+                <a:spcPct val="0"/>
+              </a:spcAft>
+              <a:buChar char="»"/>
+              <a:defRPr sz="2000">
+                <a:solidFill>
+                  <a:schemeClr val="tx1"/>
+                </a:solidFill>
+                <a:latin typeface="Verdana" panose="020B0604030504040204" pitchFamily="34" charset="0"/>
+                <a:cs typeface="Times New Roman" panose="02020603050405020304" pitchFamily="18" charset="0"/>
+              </a:defRPr>
+            </a:lvl7pPr>
+            <a:lvl8pPr marL="3429000" indent="-228600" eaLnBrk="0" fontAlgn="base" hangingPunct="0">
+              <a:spcBef>
+                <a:spcPct val="20000"/>
+              </a:spcBef>
+              <a:spcAft>
+                <a:spcPct val="0"/>
+              </a:spcAft>
+              <a:buChar char="»"/>
+              <a:defRPr sz="2000">
+                <a:solidFill>
+                  <a:schemeClr val="tx1"/>
+                </a:solidFill>
+                <a:latin typeface="Verdana" panose="020B0604030504040204" pitchFamily="34" charset="0"/>
+                <a:cs typeface="Times New Roman" panose="02020603050405020304" pitchFamily="18" charset="0"/>
+              </a:defRPr>
+            </a:lvl8pPr>
+            <a:lvl9pPr marL="3886200" indent="-228600" eaLnBrk="0" fontAlgn="base" hangingPunct="0">
+              <a:spcBef>
+                <a:spcPct val="20000"/>
+              </a:spcBef>
+              <a:spcAft>
+                <a:spcPct val="0"/>
+              </a:spcAft>
+              <a:buChar char="»"/>
+              <a:defRPr sz="2000">
+                <a:solidFill>
+                  <a:schemeClr val="tx1"/>
+                </a:solidFill>
+                <a:latin typeface="Verdana" panose="020B0604030504040204" pitchFamily="34" charset="0"/>
+                <a:cs typeface="Times New Roman" panose="02020603050405020304" pitchFamily="18" charset="0"/>
+              </a:defRPr>
+            </a:lvl9pPr>
+          </a:lstStyle>
+          <a:p>
+            <a:pPr algn="ctr">
+              <a:spcBef>
+                <a:spcPct val="0"/>
+              </a:spcBef>
+              <a:spcAft>
+                <a:spcPts val="600"/>
+              </a:spcAft>
+              <a:buNone/>
+            </a:pPr>
+            <a:r>
+              <a:rPr lang="en-US" altLang="en-US" sz="2800" cap="all" spc="-60" dirty="0">
+                <a:ln w="3175" cmpd="sng">
+                  <a:noFill/>
+                </a:ln>
+                <a:solidFill>
+                  <a:srgbClr val="FF0000"/>
+                </a:solidFill>
+                <a:effectLst>
+                  <a:glow rad="38100">
+                    <a:schemeClr val="bg1">
+                      <a:lumMod val="65000"/>
+                      <a:lumOff val="35000"/>
+                      <a:alpha val="40000"/>
+                    </a:schemeClr>
+                  </a:glow>
+                  <a:outerShdw blurRad="28575" dist="38100" dir="14040000" algn="tl" rotWithShape="0">
+                    <a:srgbClr val="000000">
+                      <a:alpha val="25000"/>
+                    </a:srgbClr>
+                  </a:outerShdw>
+                </a:effectLst>
+                <a:latin typeface="Calisto MT" panose="02040603050505030304" pitchFamily="18" charset="0"/>
+                <a:ea typeface="+mj-ea"/>
+                <a:cs typeface="+mj-cs"/>
+              </a:rPr>
+              <a:t>Saritha</a:t>
+            </a:r>
+          </a:p>
+          <a:p>
+            <a:pPr algn="ctr">
+              <a:spcBef>
+                <a:spcPct val="0"/>
+              </a:spcBef>
+              <a:spcAft>
+                <a:spcPts val="600"/>
+              </a:spcAft>
+              <a:buNone/>
+            </a:pPr>
+            <a:r>
+              <a:rPr lang="en-US" altLang="en-US" sz="2800" cap="all" spc="-60" dirty="0">
+                <a:ln w="3175" cmpd="sng">
+                  <a:noFill/>
+                </a:ln>
+                <a:gradFill flip="none" rotWithShape="1">
+                  <a:gsLst>
+                    <a:gs pos="0">
+                      <a:schemeClr val="tx1"/>
+                    </a:gs>
+                    <a:gs pos="100000">
+                      <a:schemeClr val="tx1">
+                        <a:lumMod val="65000"/>
+                      </a:schemeClr>
+                    </a:gs>
+                  </a:gsLst>
+                  <a:lin ang="5580000" scaled="0"/>
+                  <a:tileRect/>
+                </a:gradFill>
+                <a:effectLst>
+                  <a:glow rad="38100">
+                    <a:schemeClr val="bg1">
+                      <a:lumMod val="65000"/>
+                      <a:lumOff val="35000"/>
+                      <a:alpha val="40000"/>
+                    </a:schemeClr>
+                  </a:glow>
+                  <a:outerShdw blurRad="28575" dist="38100" dir="14040000" algn="tl" rotWithShape="0">
+                    <a:srgbClr val="000000">
+                      <a:alpha val="25000"/>
+                    </a:srgbClr>
+                  </a:outerShdw>
+                </a:effectLst>
+                <a:latin typeface="Calisto MT" panose="02040603050505030304" pitchFamily="18" charset="0"/>
+                <a:ea typeface="+mj-ea"/>
+                <a:cs typeface="+mj-cs"/>
+              </a:rPr>
+              <a:t>Renee </a:t>
+            </a:r>
+          </a:p>
+          <a:p>
+            <a:pPr algn="ctr">
+              <a:spcBef>
+                <a:spcPct val="0"/>
+              </a:spcBef>
+              <a:spcAft>
+                <a:spcPts val="600"/>
+              </a:spcAft>
+              <a:buNone/>
+            </a:pPr>
+            <a:r>
+              <a:rPr lang="en-US" altLang="en-US" sz="2800" cap="all" spc="-60" dirty="0">
+                <a:ln w="3175" cmpd="sng">
+                  <a:noFill/>
+                </a:ln>
+                <a:solidFill>
+                  <a:srgbClr val="FF0000"/>
+                </a:solidFill>
+                <a:effectLst>
+                  <a:glow rad="38100">
+                    <a:schemeClr val="bg1">
+                      <a:lumMod val="65000"/>
+                      <a:lumOff val="35000"/>
+                      <a:alpha val="40000"/>
+                    </a:schemeClr>
+                  </a:glow>
+                  <a:outerShdw blurRad="28575" dist="38100" dir="14040000" algn="tl" rotWithShape="0">
+                    <a:srgbClr val="000000">
+                      <a:alpha val="25000"/>
+                    </a:srgbClr>
+                  </a:outerShdw>
+                </a:effectLst>
+                <a:latin typeface="Calisto MT" panose="02040603050505030304" pitchFamily="18" charset="0"/>
+                <a:ea typeface="+mj-ea"/>
+                <a:cs typeface="+mj-cs"/>
+              </a:rPr>
+              <a:t>Matt</a:t>
+            </a:r>
+            <a:endParaRPr lang="en-US" altLang="en-US" sz="2800" kern="1200" cap="all" spc="-60" dirty="0">
+              <a:ln w="3175" cmpd="sng">
+                <a:noFill/>
+              </a:ln>
+              <a:solidFill>
+                <a:srgbClr val="FF0000"/>
+              </a:solidFill>
+              <a:effectLst>
+                <a:glow rad="38100">
+                  <a:schemeClr val="bg1">
+                    <a:lumMod val="65000"/>
+                    <a:lumOff val="35000"/>
+                    <a:alpha val="40000"/>
+                  </a:schemeClr>
+                </a:glow>
+                <a:outerShdw blurRad="28575" dist="38100" dir="14040000" algn="tl" rotWithShape="0">
+                  <a:srgbClr val="000000">
+                    <a:alpha val="25000"/>
+                  </a:srgbClr>
+                </a:outerShdw>
+              </a:effectLst>
+              <a:latin typeface="Calisto MT" panose="02040603050505030304" pitchFamily="18" charset="0"/>
+              <a:ea typeface="+mj-ea"/>
+              <a:cs typeface="+mj-cs"/>
+            </a:endParaRPr>
+          </a:p>
+        </p:txBody>
+      </p:sp>
     </p:spTree>
     <p:extLst>
       <p:ext uri="{BB962C8B-B14F-4D97-AF65-F5344CB8AC3E}">
@@ -11231,18 +11551,16 @@
             </a:endParaRPr>
           </a:p>
           <a:p>
-            <a:pPr>
+            <a:pPr marL="0" indent="0">
               <a:spcBef>
                 <a:spcPts val="600"/>
               </a:spcBef>
+              <a:buNone/>
               <a:defRPr/>
             </a:pPr>
-            <a:r>
-              <a:rPr lang="en-US" altLang="en-US" sz="2000" kern="0" dirty="0">
-                <a:latin typeface="Calisto MT" panose="02040603050505030304" pitchFamily="18" charset="0"/>
-              </a:rPr>
-              <a:t>Panel</a:t>
-            </a:r>
+            <a:endParaRPr lang="en-US" altLang="en-US" sz="2000" kern="0" dirty="0">
+              <a:latin typeface="Calisto MT" panose="02040603050505030304" pitchFamily="18" charset="0"/>
+            </a:endParaRPr>
           </a:p>
           <a:p>
             <a:pPr>
@@ -12534,286 +12852,6 @@
       </p:grpSpPr>
       <p:sp>
         <p:nvSpPr>
-          <p:cNvPr id="2" name="Title 1">
-            <a:extLst>
-              <a:ext uri="{FF2B5EF4-FFF2-40B4-BE49-F238E27FC236}">
-                <a16:creationId xmlns:a16="http://schemas.microsoft.com/office/drawing/2014/main" id="{33FD0A60-4A82-29AA-8FFC-FFCE159D5D62}"/>
-              </a:ext>
-            </a:extLst>
-          </p:cNvPr>
-          <p:cNvSpPr>
-            <a:spLocks noGrp="1"/>
-          </p:cNvSpPr>
-          <p:nvPr>
-            <p:ph type="title"/>
-          </p:nvPr>
-        </p:nvSpPr>
-        <p:spPr/>
-        <p:txBody>
-          <a:bodyPr/>
-          <a:lstStyle/>
-          <a:p>
-            <a:endParaRPr lang="en-US"/>
-          </a:p>
-        </p:txBody>
-      </p:sp>
-      <p:sp>
-        <p:nvSpPr>
-          <p:cNvPr id="3" name="Content Placeholder 2">
-            <a:extLst>
-              <a:ext uri="{FF2B5EF4-FFF2-40B4-BE49-F238E27FC236}">
-                <a16:creationId xmlns:a16="http://schemas.microsoft.com/office/drawing/2014/main" id="{D46D6FDF-B9D4-9CED-C647-EA8B06BC5DD7}"/>
-              </a:ext>
-            </a:extLst>
-          </p:cNvPr>
-          <p:cNvSpPr>
-            <a:spLocks noGrp="1"/>
-          </p:cNvSpPr>
-          <p:nvPr>
-            <p:ph idx="1"/>
-          </p:nvPr>
-        </p:nvSpPr>
-        <p:spPr/>
-        <p:txBody>
-          <a:bodyPr/>
-          <a:lstStyle/>
-          <a:p>
-            <a:endParaRPr lang="en-US"/>
-          </a:p>
-        </p:txBody>
-      </p:sp>
-      <p:sp>
-        <p:nvSpPr>
-          <p:cNvPr id="4" name="Text Box 2">
-            <a:extLst>
-              <a:ext uri="{FF2B5EF4-FFF2-40B4-BE49-F238E27FC236}">
-                <a16:creationId xmlns:a16="http://schemas.microsoft.com/office/drawing/2014/main" id="{10E418AF-5945-E7AC-0978-0473AE148968}"/>
-              </a:ext>
-            </a:extLst>
-          </p:cNvPr>
-          <p:cNvSpPr txBox="1">
-            <a:spLocks noChangeArrowheads="1"/>
-          </p:cNvSpPr>
-          <p:nvPr/>
-        </p:nvSpPr>
-        <p:spPr bwMode="auto">
-          <a:xfrm>
-            <a:off x="2128889" y="60822"/>
-            <a:ext cx="4786247" cy="769441"/>
-          </a:xfrm>
-          <a:prstGeom prst="rect">
-            <a:avLst/>
-          </a:prstGeom>
-          <a:noFill/>
-          <a:ln>
-            <a:noFill/>
-          </a:ln>
-          <a:extLst>
-            <a:ext uri="{909E8E84-426E-40DD-AFC4-6F175D3DCCD1}">
-              <a14:hiddenFill xmlns:a14="http://schemas.microsoft.com/office/drawing/2010/main">
-                <a:solidFill>
-                  <a:srgbClr val="FFFFFF"/>
-                </a:solidFill>
-              </a14:hiddenFill>
-            </a:ext>
-            <a:ext uri="{91240B29-F687-4F45-9708-019B960494DF}">
-              <a14:hiddenLine xmlns:a14="http://schemas.microsoft.com/office/drawing/2010/main" w="9525">
-                <a:solidFill>
-                  <a:srgbClr val="000000"/>
-                </a:solidFill>
-                <a:miter lim="800000"/>
-                <a:headEnd/>
-                <a:tailEnd/>
-              </a14:hiddenLine>
-            </a:ext>
-          </a:extLst>
-        </p:spPr>
-        <p:txBody>
-          <a:bodyPr wrap="none" anchor="b">
-            <a:spAutoFit/>
-          </a:bodyPr>
-          <a:lstStyle>
-            <a:lvl1pPr>
-              <a:spcBef>
-                <a:spcPct val="20000"/>
-              </a:spcBef>
-              <a:buChar char="•"/>
-              <a:defRPr sz="3200">
-                <a:solidFill>
-                  <a:schemeClr val="tx1"/>
-                </a:solidFill>
-                <a:latin typeface="Verdana" panose="020B0604030504040204" pitchFamily="34" charset="0"/>
-                <a:cs typeface="Times New Roman" panose="02020603050405020304" pitchFamily="18" charset="0"/>
-              </a:defRPr>
-            </a:lvl1pPr>
-            <a:lvl2pPr marL="742950" indent="-285750">
-              <a:spcBef>
-                <a:spcPct val="20000"/>
-              </a:spcBef>
-              <a:buChar char="–"/>
-              <a:defRPr sz="2800">
-                <a:solidFill>
-                  <a:schemeClr val="tx1"/>
-                </a:solidFill>
-                <a:latin typeface="Verdana" panose="020B0604030504040204" pitchFamily="34" charset="0"/>
-                <a:cs typeface="Times New Roman" panose="02020603050405020304" pitchFamily="18" charset="0"/>
-              </a:defRPr>
-            </a:lvl2pPr>
-            <a:lvl3pPr marL="1143000" indent="-228600">
-              <a:spcBef>
-                <a:spcPct val="20000"/>
-              </a:spcBef>
-              <a:buChar char="•"/>
-              <a:defRPr sz="2400">
-                <a:solidFill>
-                  <a:schemeClr val="tx1"/>
-                </a:solidFill>
-                <a:latin typeface="Verdana" panose="020B0604030504040204" pitchFamily="34" charset="0"/>
-                <a:cs typeface="Times New Roman" panose="02020603050405020304" pitchFamily="18" charset="0"/>
-              </a:defRPr>
-            </a:lvl3pPr>
-            <a:lvl4pPr marL="1600200" indent="-228600">
-              <a:spcBef>
-                <a:spcPct val="20000"/>
-              </a:spcBef>
-              <a:buChar char="–"/>
-              <a:defRPr sz="2000">
-                <a:solidFill>
-                  <a:schemeClr val="tx1"/>
-                </a:solidFill>
-                <a:latin typeface="Verdana" panose="020B0604030504040204" pitchFamily="34" charset="0"/>
-                <a:cs typeface="Times New Roman" panose="02020603050405020304" pitchFamily="18" charset="0"/>
-              </a:defRPr>
-            </a:lvl4pPr>
-            <a:lvl5pPr marL="2057400" indent="-228600">
-              <a:spcBef>
-                <a:spcPct val="20000"/>
-              </a:spcBef>
-              <a:buChar char="»"/>
-              <a:defRPr sz="2000">
-                <a:solidFill>
-                  <a:schemeClr val="tx1"/>
-                </a:solidFill>
-                <a:latin typeface="Verdana" panose="020B0604030504040204" pitchFamily="34" charset="0"/>
-                <a:cs typeface="Times New Roman" panose="02020603050405020304" pitchFamily="18" charset="0"/>
-              </a:defRPr>
-            </a:lvl5pPr>
-            <a:lvl6pPr marL="2514600" indent="-228600" eaLnBrk="0" fontAlgn="base" hangingPunct="0">
-              <a:spcBef>
-                <a:spcPct val="20000"/>
-              </a:spcBef>
-              <a:spcAft>
-                <a:spcPct val="0"/>
-              </a:spcAft>
-              <a:buChar char="»"/>
-              <a:defRPr sz="2000">
-                <a:solidFill>
-                  <a:schemeClr val="tx1"/>
-                </a:solidFill>
-                <a:latin typeface="Verdana" panose="020B0604030504040204" pitchFamily="34" charset="0"/>
-                <a:cs typeface="Times New Roman" panose="02020603050405020304" pitchFamily="18" charset="0"/>
-              </a:defRPr>
-            </a:lvl6pPr>
-            <a:lvl7pPr marL="2971800" indent="-228600" eaLnBrk="0" fontAlgn="base" hangingPunct="0">
-              <a:spcBef>
-                <a:spcPct val="20000"/>
-              </a:spcBef>
-              <a:spcAft>
-                <a:spcPct val="0"/>
-              </a:spcAft>
-              <a:buChar char="»"/>
-              <a:defRPr sz="2000">
-                <a:solidFill>
-                  <a:schemeClr val="tx1"/>
-                </a:solidFill>
-                <a:latin typeface="Verdana" panose="020B0604030504040204" pitchFamily="34" charset="0"/>
-                <a:cs typeface="Times New Roman" panose="02020603050405020304" pitchFamily="18" charset="0"/>
-              </a:defRPr>
-            </a:lvl7pPr>
-            <a:lvl8pPr marL="3429000" indent="-228600" eaLnBrk="0" fontAlgn="base" hangingPunct="0">
-              <a:spcBef>
-                <a:spcPct val="20000"/>
-              </a:spcBef>
-              <a:spcAft>
-                <a:spcPct val="0"/>
-              </a:spcAft>
-              <a:buChar char="»"/>
-              <a:defRPr sz="2000">
-                <a:solidFill>
-                  <a:schemeClr val="tx1"/>
-                </a:solidFill>
-                <a:latin typeface="Verdana" panose="020B0604030504040204" pitchFamily="34" charset="0"/>
-                <a:cs typeface="Times New Roman" panose="02020603050405020304" pitchFamily="18" charset="0"/>
-              </a:defRPr>
-            </a:lvl8pPr>
-            <a:lvl9pPr marL="3886200" indent="-228600" eaLnBrk="0" fontAlgn="base" hangingPunct="0">
-              <a:spcBef>
-                <a:spcPct val="20000"/>
-              </a:spcBef>
-              <a:spcAft>
-                <a:spcPct val="0"/>
-              </a:spcAft>
-              <a:buChar char="»"/>
-              <a:defRPr sz="2000">
-                <a:solidFill>
-                  <a:schemeClr val="tx1"/>
-                </a:solidFill>
-                <a:latin typeface="Verdana" panose="020B0604030504040204" pitchFamily="34" charset="0"/>
-                <a:cs typeface="Times New Roman" panose="02020603050405020304" pitchFamily="18" charset="0"/>
-              </a:defRPr>
-            </a:lvl9pPr>
-          </a:lstStyle>
-          <a:p>
-            <a:pPr algn="ctr" eaLnBrk="1" hangingPunct="1">
-              <a:spcBef>
-                <a:spcPct val="0"/>
-              </a:spcBef>
-              <a:buFontTx/>
-              <a:buNone/>
-            </a:pPr>
-            <a:r>
-              <a:rPr lang="en-US" altLang="en-US" sz="4400" dirty="0">
-                <a:latin typeface="Calisto MT" panose="02040603050505030304" pitchFamily="18" charset="0"/>
-                <a:ea typeface="SimHei" panose="02010609060101010101" pitchFamily="49" charset="-122"/>
-                <a:cs typeface="Leelawadee" panose="020B0502040204020203" pitchFamily="34" charset="-34"/>
-              </a:rPr>
-              <a:t>Final output: Panel</a:t>
-            </a:r>
-          </a:p>
-        </p:txBody>
-      </p:sp>
-    </p:spTree>
-    <p:extLst>
-      <p:ext uri="{BB962C8B-B14F-4D97-AF65-F5344CB8AC3E}">
-        <p14:creationId xmlns:p14="http://schemas.microsoft.com/office/powerpoint/2010/main" val="790298844"/>
-      </p:ext>
-    </p:extLst>
-  </p:cSld>
-  <p:clrMapOvr>
-    <a:masterClrMapping/>
-  </p:clrMapOvr>
-</p:sld>
-</file>
-
-<file path=ppt/slides/slide14.xml><?xml version="1.0" encoding="utf-8"?>
-<p:sld xmlns:a="http://schemas.openxmlformats.org/drawingml/2006/main" xmlns:r="http://schemas.openxmlformats.org/officeDocument/2006/relationships" xmlns:p="http://schemas.openxmlformats.org/presentationml/2006/main">
-  <p:cSld>
-    <p:spTree>
-      <p:nvGrpSpPr>
-        <p:cNvPr id="1" name=""/>
-        <p:cNvGrpSpPr/>
-        <p:nvPr/>
-      </p:nvGrpSpPr>
-      <p:grpSpPr>
-        <a:xfrm>
-          <a:off x="0" y="0"/>
-          <a:ext cx="0" cy="0"/>
-          <a:chOff x="0" y="0"/>
-          <a:chExt cx="0" cy="0"/>
-        </a:xfrm>
-      </p:grpSpPr>
-      <p:sp>
-        <p:nvSpPr>
           <p:cNvPr id="3" name="Content Placeholder 2">
             <a:extLst>
               <a:ext uri="{FF2B5EF4-FFF2-40B4-BE49-F238E27FC236}">
@@ -13294,7 +13332,7 @@
 </p:sld>
 </file>
 
-<file path=ppt/slides/slide15.xml><?xml version="1.0" encoding="utf-8"?>
+<file path=ppt/slides/slide14.xml><?xml version="1.0" encoding="utf-8"?>
 <p:sld xmlns:a="http://schemas.openxmlformats.org/drawingml/2006/main" xmlns:r="http://schemas.openxmlformats.org/officeDocument/2006/relationships" xmlns:p="http://schemas.openxmlformats.org/presentationml/2006/main">
   <p:cSld>
     <p:spTree>

</xml_diff>